<commit_message>
Fixed no background image
</commit_message>
<xml_diff>
--- a/Documents/Document.pptx
+++ b/Documents/Document.pptx
@@ -3350,10 +3350,10 @@
       </p:grpSpPr>
       <p:grpSp>
         <p:nvGrpSpPr>
-          <p:cNvPr id="6" name="กลุ่ม 5">
-            <a:extLst>
-              <a:ext uri="{FF2B5EF4-FFF2-40B4-BE49-F238E27FC236}">
-                <a16:creationId xmlns:a16="http://schemas.microsoft.com/office/drawing/2014/main" id="{4084C316-A330-4DE4-AEB8-27E8AD94336A}"/>
+          <p:cNvPr id="10" name="กลุ่ม 9">
+            <a:extLst>
+              <a:ext uri="{FF2B5EF4-FFF2-40B4-BE49-F238E27FC236}">
+                <a16:creationId xmlns:a16="http://schemas.microsoft.com/office/drawing/2014/main" id="{58744E84-21DB-4D57-8673-DDDC38071F7D}"/>
               </a:ext>
             </a:extLst>
           </p:cNvPr>
@@ -3362,18 +3362,70 @@
         </p:nvGrpSpPr>
         <p:grpSpPr>
           <a:xfrm>
-            <a:off x="2343212" y="786809"/>
-            <a:ext cx="6985591" cy="5722511"/>
-            <a:chOff x="2343212" y="786809"/>
-            <a:chExt cx="6985591" cy="5722511"/>
+            <a:off x="1779264" y="500182"/>
+            <a:ext cx="8113486" cy="6125029"/>
+            <a:chOff x="1779264" y="500182"/>
+            <a:chExt cx="8113486" cy="6125029"/>
           </a:xfrm>
         </p:grpSpPr>
+        <p:sp>
+          <p:nvSpPr>
+            <p:cNvPr id="7" name="สี่เหลี่ยมผืนผ้า 6">
+              <a:extLst>
+                <a:ext uri="{FF2B5EF4-FFF2-40B4-BE49-F238E27FC236}">
+                  <a16:creationId xmlns:a16="http://schemas.microsoft.com/office/drawing/2014/main" id="{C23C6254-548B-4E41-8383-9B418E20988B}"/>
+                </a:ext>
+              </a:extLst>
+            </p:cNvPr>
+            <p:cNvSpPr/>
+            <p:nvPr/>
+          </p:nvSpPr>
+          <p:spPr>
+            <a:xfrm>
+              <a:off x="1779264" y="500182"/>
+              <a:ext cx="8113486" cy="6125029"/>
+            </a:xfrm>
+            <a:prstGeom prst="rect">
+              <a:avLst/>
+            </a:prstGeom>
+            <a:solidFill>
+              <a:schemeClr val="bg1"/>
+            </a:solidFill>
+            <a:ln>
+              <a:noFill/>
+            </a:ln>
+          </p:spPr>
+          <p:style>
+            <a:lnRef idx="2">
+              <a:schemeClr val="accent1">
+                <a:shade val="50000"/>
+              </a:schemeClr>
+            </a:lnRef>
+            <a:fillRef idx="1">
+              <a:schemeClr val="accent1"/>
+            </a:fillRef>
+            <a:effectRef idx="0">
+              <a:schemeClr val="accent1"/>
+            </a:effectRef>
+            <a:fontRef idx="minor">
+              <a:schemeClr val="lt1"/>
+            </a:fontRef>
+          </p:style>
+          <p:txBody>
+            <a:bodyPr rtlCol="0" anchor="ctr"/>
+            <a:lstStyle/>
+            <a:p>
+              <a:pPr algn="ctr"/>
+              <a:endParaRPr lang="en-US"/>
+            </a:p>
+          </p:txBody>
+        </p:sp>
         <p:grpSp>
           <p:nvGrpSpPr>
-            <p:cNvPr id="29" name="กลุ่ม 28">
+            <p:cNvPr id="6" name="กลุ่ม 5">
               <a:extLst>
                 <a:ext uri="{FF2B5EF4-FFF2-40B4-BE49-F238E27FC236}">
-                  <a16:creationId xmlns:a16="http://schemas.microsoft.com/office/drawing/2014/main" id="{B5185313-9F1B-4ABA-BA0E-28E5C8C7E02A}"/>
+                  <a16:creationId xmlns:a16="http://schemas.microsoft.com/office/drawing/2014/main" id="{4084C316-A330-4DE4-AEB8-27E8AD94336A}"/>
                 </a:ext>
               </a:extLst>
             </p:cNvPr>
@@ -3384,841 +3436,862 @@
             <a:xfrm>
               <a:off x="2343212" y="786809"/>
               <a:ext cx="6985591" cy="5722511"/>
-              <a:chOff x="2386755" y="786809"/>
+              <a:chOff x="2343212" y="786809"/>
               <a:chExt cx="6985591" cy="5722511"/>
             </a:xfrm>
           </p:grpSpPr>
-          <p:sp>
-            <p:nvSpPr>
-              <p:cNvPr id="22" name="สี่เหลี่ยมผืนผ้า 21">
+          <p:grpSp>
+            <p:nvGrpSpPr>
+              <p:cNvPr id="29" name="กลุ่ม 28">
                 <a:extLst>
                   <a:ext uri="{FF2B5EF4-FFF2-40B4-BE49-F238E27FC236}">
-                    <a16:creationId xmlns:a16="http://schemas.microsoft.com/office/drawing/2014/main" id="{F1A7BFC1-FB96-4FA4-8DB4-052FF6F7DA2E}"/>
+                    <a16:creationId xmlns:a16="http://schemas.microsoft.com/office/drawing/2014/main" id="{B5185313-9F1B-4ABA-BA0E-28E5C8C7E02A}"/>
                   </a:ext>
                 </a:extLst>
               </p:cNvPr>
-              <p:cNvSpPr/>
+              <p:cNvGrpSpPr/>
               <p:nvPr/>
-            </p:nvSpPr>
-            <p:spPr>
+            </p:nvGrpSpPr>
+            <p:grpSpPr>
               <a:xfrm>
-                <a:off x="2386755" y="786809"/>
+                <a:off x="2343212" y="786809"/>
                 <a:ext cx="6985591" cy="5722511"/>
+                <a:chOff x="2386755" y="786809"/>
+                <a:chExt cx="6985591" cy="5722511"/>
               </a:xfrm>
-              <a:prstGeom prst="rect">
-                <a:avLst/>
-              </a:prstGeom>
-              <a:noFill/>
-              <a:ln>
+            </p:grpSpPr>
+            <p:sp>
+              <p:nvSpPr>
+                <p:cNvPr id="22" name="สี่เหลี่ยมผืนผ้า 21">
+                  <a:extLst>
+                    <a:ext uri="{FF2B5EF4-FFF2-40B4-BE49-F238E27FC236}">
+                      <a16:creationId xmlns:a16="http://schemas.microsoft.com/office/drawing/2014/main" id="{F1A7BFC1-FB96-4FA4-8DB4-052FF6F7DA2E}"/>
+                    </a:ext>
+                  </a:extLst>
+                </p:cNvPr>
+                <p:cNvSpPr/>
+                <p:nvPr/>
+              </p:nvSpPr>
+              <p:spPr>
+                <a:xfrm>
+                  <a:off x="2386755" y="786809"/>
+                  <a:ext cx="6985591" cy="5722511"/>
+                </a:xfrm>
+                <a:prstGeom prst="rect">
+                  <a:avLst/>
+                </a:prstGeom>
                 <a:noFill/>
-              </a:ln>
-            </p:spPr>
-            <p:style>
-              <a:lnRef idx="2">
-                <a:schemeClr val="accent1">
-                  <a:shade val="50000"/>
-                </a:schemeClr>
-              </a:lnRef>
-              <a:fillRef idx="1">
-                <a:schemeClr val="accent1"/>
-              </a:fillRef>
-              <a:effectRef idx="0">
-                <a:schemeClr val="accent1"/>
-              </a:effectRef>
-              <a:fontRef idx="minor">
-                <a:schemeClr val="lt1"/>
-              </a:fontRef>
-            </p:style>
-            <p:txBody>
-              <a:bodyPr rtlCol="0" anchor="ctr"/>
-              <a:lstStyle/>
-              <a:p>
-                <a:pPr algn="ctr"/>
-                <a:endParaRPr lang="en-US"/>
-              </a:p>
-            </p:txBody>
-          </p:sp>
-          <p:sp>
-            <p:nvSpPr>
-              <p:cNvPr id="4" name="สี่เหลี่ยมผืนผ้า 3">
+                <a:ln>
+                  <a:noFill/>
+                </a:ln>
+              </p:spPr>
+              <p:style>
+                <a:lnRef idx="2">
+                  <a:schemeClr val="accent1">
+                    <a:shade val="50000"/>
+                  </a:schemeClr>
+                </a:lnRef>
+                <a:fillRef idx="1">
+                  <a:schemeClr val="accent1"/>
+                </a:fillRef>
+                <a:effectRef idx="0">
+                  <a:schemeClr val="accent1"/>
+                </a:effectRef>
+                <a:fontRef idx="minor">
+                  <a:schemeClr val="lt1"/>
+                </a:fontRef>
+              </p:style>
+              <p:txBody>
+                <a:bodyPr rtlCol="0" anchor="ctr"/>
+                <a:lstStyle/>
+                <a:p>
+                  <a:pPr algn="ctr"/>
+                  <a:endParaRPr lang="en-US"/>
+                </a:p>
+              </p:txBody>
+            </p:sp>
+            <p:sp>
+              <p:nvSpPr>
+                <p:cNvPr id="4" name="สี่เหลี่ยมผืนผ้า 3">
+                  <a:extLst>
+                    <a:ext uri="{FF2B5EF4-FFF2-40B4-BE49-F238E27FC236}">
+                      <a16:creationId xmlns:a16="http://schemas.microsoft.com/office/drawing/2014/main" id="{D49731BF-F176-4D63-80CD-E01E1AA3E1B9}"/>
+                    </a:ext>
+                  </a:extLst>
+                </p:cNvPr>
+                <p:cNvSpPr/>
+                <p:nvPr/>
+              </p:nvSpPr>
+              <p:spPr>
+                <a:xfrm>
+                  <a:off x="3735613" y="2288195"/>
+                  <a:ext cx="4590597" cy="3519376"/>
+                </a:xfrm>
+                <a:prstGeom prst="rect">
+                  <a:avLst/>
+                </a:prstGeom>
+                <a:noFill/>
+                <a:ln w="38100">
+                  <a:solidFill>
+                    <a:schemeClr val="tx1"/>
+                  </a:solidFill>
+                </a:ln>
+              </p:spPr>
+              <p:style>
+                <a:lnRef idx="2">
+                  <a:schemeClr val="accent1">
+                    <a:shade val="50000"/>
+                  </a:schemeClr>
+                </a:lnRef>
+                <a:fillRef idx="1">
+                  <a:schemeClr val="accent1"/>
+                </a:fillRef>
+                <a:effectRef idx="0">
+                  <a:schemeClr val="accent1"/>
+                </a:effectRef>
+                <a:fontRef idx="minor">
+                  <a:schemeClr val="lt1"/>
+                </a:fontRef>
+              </p:style>
+              <p:txBody>
+                <a:bodyPr rtlCol="0" anchor="ctr"/>
+                <a:lstStyle/>
+                <a:p>
+                  <a:pPr algn="ctr"/>
+                  <a:endParaRPr lang="en-US"/>
+                </a:p>
+              </p:txBody>
+            </p:sp>
+            <p:cxnSp>
+              <p:nvCxnSpPr>
+                <p:cNvPr id="8" name="ลูกศรเชื่อมต่อแบบตรง 7">
+                  <a:extLst>
+                    <a:ext uri="{FF2B5EF4-FFF2-40B4-BE49-F238E27FC236}">
+                      <a16:creationId xmlns:a16="http://schemas.microsoft.com/office/drawing/2014/main" id="{DC61EE91-CB26-484C-BF5A-7E113821A4F8}"/>
+                    </a:ext>
+                  </a:extLst>
+                </p:cNvPr>
+                <p:cNvCxnSpPr>
+                  <a:cxnSpLocks/>
+                </p:cNvCxnSpPr>
+                <p:nvPr/>
+              </p:nvCxnSpPr>
+              <p:spPr>
+                <a:xfrm>
+                  <a:off x="3735613" y="2043646"/>
+                  <a:ext cx="4590597" cy="0"/>
+                </a:xfrm>
+                <a:prstGeom prst="straightConnector1">
+                  <a:avLst/>
+                </a:prstGeom>
+                <a:ln w="38100">
+                  <a:solidFill>
+                    <a:schemeClr val="tx1"/>
+                  </a:solidFill>
+                  <a:headEnd type="triangle"/>
+                  <a:tailEnd type="triangle"/>
+                </a:ln>
+              </p:spPr>
+              <p:style>
+                <a:lnRef idx="1">
+                  <a:schemeClr val="accent1"/>
+                </a:lnRef>
+                <a:fillRef idx="0">
+                  <a:schemeClr val="accent1"/>
+                </a:fillRef>
+                <a:effectRef idx="0">
+                  <a:schemeClr val="accent1"/>
+                </a:effectRef>
+                <a:fontRef idx="minor">
+                  <a:schemeClr val="tx1"/>
+                </a:fontRef>
+              </p:style>
+            </p:cxnSp>
+            <p:cxnSp>
+              <p:nvCxnSpPr>
+                <p:cNvPr id="9" name="ลูกศรเชื่อมต่อแบบตรง 8">
+                  <a:extLst>
+                    <a:ext uri="{FF2B5EF4-FFF2-40B4-BE49-F238E27FC236}">
+                      <a16:creationId xmlns:a16="http://schemas.microsoft.com/office/drawing/2014/main" id="{1C21033C-BE05-4E0F-A172-5DC762C68179}"/>
+                    </a:ext>
+                  </a:extLst>
+                </p:cNvPr>
+                <p:cNvCxnSpPr>
+                  <a:cxnSpLocks/>
+                </p:cNvCxnSpPr>
+                <p:nvPr/>
+              </p:nvCxnSpPr>
+              <p:spPr>
+                <a:xfrm>
+                  <a:off x="3526507" y="2288195"/>
+                  <a:ext cx="0" cy="3519376"/>
+                </a:xfrm>
+                <a:prstGeom prst="straightConnector1">
+                  <a:avLst/>
+                </a:prstGeom>
+                <a:ln w="38100">
+                  <a:solidFill>
+                    <a:schemeClr val="tx1"/>
+                  </a:solidFill>
+                  <a:headEnd type="triangle"/>
+                  <a:tailEnd type="triangle"/>
+                </a:ln>
+              </p:spPr>
+              <p:style>
+                <a:lnRef idx="1">
+                  <a:schemeClr val="accent1"/>
+                </a:lnRef>
+                <a:fillRef idx="0">
+                  <a:schemeClr val="accent1"/>
+                </a:fillRef>
+                <a:effectRef idx="0">
+                  <a:schemeClr val="accent1"/>
+                </a:effectRef>
+                <a:fontRef idx="minor">
+                  <a:schemeClr val="tx1"/>
+                </a:fontRef>
+              </p:style>
+            </p:cxnSp>
+            <p:sp>
+              <p:nvSpPr>
+                <p:cNvPr id="12" name="กล่องข้อความ 11">
+                  <a:extLst>
+                    <a:ext uri="{FF2B5EF4-FFF2-40B4-BE49-F238E27FC236}">
+                      <a16:creationId xmlns:a16="http://schemas.microsoft.com/office/drawing/2014/main" id="{09EA24E5-0281-4646-9758-771DEF338D8F}"/>
+                    </a:ext>
+                  </a:extLst>
+                </p:cNvPr>
+                <p:cNvSpPr txBox="1"/>
+                <p:nvPr/>
+              </p:nvSpPr>
+              <p:spPr>
+                <a:xfrm>
+                  <a:off x="5831733" y="1552040"/>
+                  <a:ext cx="636713" cy="369332"/>
+                </a:xfrm>
+                <a:prstGeom prst="rect">
+                  <a:avLst/>
+                </a:prstGeom>
+                <a:noFill/>
+              </p:spPr>
+              <p:txBody>
+                <a:bodyPr wrap="none" rtlCol="0">
+                  <a:spAutoFit/>
+                </a:bodyPr>
+                <a:lstStyle/>
+                <a:p>
+                  <a:r>
+                    <a:rPr lang="en-US" dirty="0"/>
+                    <a:t>5 cm</a:t>
+                  </a:r>
+                </a:p>
+              </p:txBody>
+            </p:sp>
+            <p:sp>
+              <p:nvSpPr>
+                <p:cNvPr id="13" name="กล่องข้อความ 12">
+                  <a:extLst>
+                    <a:ext uri="{FF2B5EF4-FFF2-40B4-BE49-F238E27FC236}">
+                      <a16:creationId xmlns:a16="http://schemas.microsoft.com/office/drawing/2014/main" id="{286CD45A-6D2B-45A2-9038-2B0733334B16}"/>
+                    </a:ext>
+                  </a:extLst>
+                </p:cNvPr>
+                <p:cNvSpPr txBox="1"/>
+                <p:nvPr/>
+              </p:nvSpPr>
+              <p:spPr>
+                <a:xfrm>
+                  <a:off x="2889794" y="3863217"/>
+                  <a:ext cx="636713" cy="369332"/>
+                </a:xfrm>
+                <a:prstGeom prst="rect">
+                  <a:avLst/>
+                </a:prstGeom>
+                <a:noFill/>
+              </p:spPr>
+              <p:txBody>
+                <a:bodyPr wrap="none" rtlCol="0">
+                  <a:spAutoFit/>
+                </a:bodyPr>
+                <a:lstStyle/>
+                <a:p>
+                  <a:r>
+                    <a:rPr lang="en-US" dirty="0"/>
+                    <a:t>4 cm</a:t>
+                  </a:r>
+                </a:p>
+              </p:txBody>
+            </p:sp>
+            <p:sp>
+              <p:nvSpPr>
+                <p:cNvPr id="14" name="สี่เหลี่ยมผืนผ้า 13">
+                  <a:extLst>
+                    <a:ext uri="{FF2B5EF4-FFF2-40B4-BE49-F238E27FC236}">
+                      <a16:creationId xmlns:a16="http://schemas.microsoft.com/office/drawing/2014/main" id="{BDA8B72E-D3EC-4536-8D49-C914A13E283A}"/>
+                    </a:ext>
+                  </a:extLst>
+                </p:cNvPr>
+                <p:cNvSpPr/>
+                <p:nvPr/>
+              </p:nvSpPr>
+              <p:spPr>
+                <a:xfrm>
+                  <a:off x="4243318" y="2708180"/>
+                  <a:ext cx="1339703" cy="1339703"/>
+                </a:xfrm>
+                <a:prstGeom prst="rect">
+                  <a:avLst/>
+                </a:prstGeom>
+                <a:noFill/>
+                <a:ln w="38100">
+                  <a:solidFill>
+                    <a:schemeClr val="tx1"/>
+                  </a:solidFill>
+                </a:ln>
+              </p:spPr>
+              <p:style>
+                <a:lnRef idx="2">
+                  <a:schemeClr val="accent1">
+                    <a:shade val="50000"/>
+                  </a:schemeClr>
+                </a:lnRef>
+                <a:fillRef idx="1">
+                  <a:schemeClr val="accent1"/>
+                </a:fillRef>
+                <a:effectRef idx="0">
+                  <a:schemeClr val="accent1"/>
+                </a:effectRef>
+                <a:fontRef idx="minor">
+                  <a:schemeClr val="lt1"/>
+                </a:fontRef>
+              </p:style>
+              <p:txBody>
+                <a:bodyPr rtlCol="0" anchor="ctr"/>
+                <a:lstStyle/>
+                <a:p>
+                  <a:pPr algn="ctr"/>
+                  <a:endParaRPr lang="en-US"/>
+                </a:p>
+              </p:txBody>
+            </p:sp>
+            <p:sp>
+              <p:nvSpPr>
+                <p:cNvPr id="17" name="สี่เหลี่ยมผืนผ้า 16">
+                  <a:extLst>
+                    <a:ext uri="{FF2B5EF4-FFF2-40B4-BE49-F238E27FC236}">
+                      <a16:creationId xmlns:a16="http://schemas.microsoft.com/office/drawing/2014/main" id="{4AA5E00A-2065-40C3-A946-B7C411A0699B}"/>
+                    </a:ext>
+                  </a:extLst>
+                </p:cNvPr>
+                <p:cNvSpPr/>
+                <p:nvPr/>
+              </p:nvSpPr>
+              <p:spPr>
+                <a:xfrm>
+                  <a:off x="6457814" y="2708180"/>
+                  <a:ext cx="1339703" cy="1339703"/>
+                </a:xfrm>
+                <a:prstGeom prst="rect">
+                  <a:avLst/>
+                </a:prstGeom>
+                <a:noFill/>
+                <a:ln w="38100">
+                  <a:solidFill>
+                    <a:schemeClr val="tx1"/>
+                  </a:solidFill>
+                </a:ln>
+              </p:spPr>
+              <p:style>
+                <a:lnRef idx="2">
+                  <a:schemeClr val="accent1">
+                    <a:shade val="50000"/>
+                  </a:schemeClr>
+                </a:lnRef>
+                <a:fillRef idx="1">
+                  <a:schemeClr val="accent1"/>
+                </a:fillRef>
+                <a:effectRef idx="0">
+                  <a:schemeClr val="accent1"/>
+                </a:effectRef>
+                <a:fontRef idx="minor">
+                  <a:schemeClr val="lt1"/>
+                </a:fontRef>
+              </p:style>
+              <p:txBody>
+                <a:bodyPr rtlCol="0" anchor="ctr"/>
+                <a:lstStyle/>
+                <a:p>
+                  <a:pPr algn="ctr"/>
+                  <a:endParaRPr lang="en-US"/>
+                </a:p>
+              </p:txBody>
+            </p:sp>
+            <p:sp>
+              <p:nvSpPr>
+                <p:cNvPr id="18" name="สี่เหลี่ยมผืนผ้า 17">
+                  <a:extLst>
+                    <a:ext uri="{FF2B5EF4-FFF2-40B4-BE49-F238E27FC236}">
+                      <a16:creationId xmlns:a16="http://schemas.microsoft.com/office/drawing/2014/main" id="{FC5A3B32-EB45-424E-B37A-00A9E1F41ACD}"/>
+                    </a:ext>
+                  </a:extLst>
+                </p:cNvPr>
+                <p:cNvSpPr/>
+                <p:nvPr/>
+              </p:nvSpPr>
+              <p:spPr>
+                <a:xfrm>
+                  <a:off x="5257829" y="2505136"/>
+                  <a:ext cx="1523997" cy="3124190"/>
+                </a:xfrm>
+                <a:prstGeom prst="rect">
+                  <a:avLst/>
+                </a:prstGeom>
+                <a:noFill/>
+                <a:ln w="38100">
+                  <a:solidFill>
+                    <a:schemeClr val="tx1"/>
+                  </a:solidFill>
+                </a:ln>
+              </p:spPr>
+              <p:style>
+                <a:lnRef idx="2">
+                  <a:schemeClr val="accent1">
+                    <a:shade val="50000"/>
+                  </a:schemeClr>
+                </a:lnRef>
+                <a:fillRef idx="1">
+                  <a:schemeClr val="accent1"/>
+                </a:fillRef>
+                <a:effectRef idx="0">
+                  <a:schemeClr val="accent1"/>
+                </a:effectRef>
+                <a:fontRef idx="minor">
+                  <a:schemeClr val="lt1"/>
+                </a:fontRef>
+              </p:style>
+              <p:txBody>
+                <a:bodyPr rtlCol="0" anchor="ctr"/>
+                <a:lstStyle/>
+                <a:p>
+                  <a:pPr algn="ctr"/>
+                  <a:endParaRPr lang="en-US"/>
+                </a:p>
+              </p:txBody>
+            </p:sp>
+            <p:sp>
+              <p:nvSpPr>
+                <p:cNvPr id="19" name="สี่เหลี่ยมผืนผ้า 18">
+                  <a:extLst>
+                    <a:ext uri="{FF2B5EF4-FFF2-40B4-BE49-F238E27FC236}">
+                      <a16:creationId xmlns:a16="http://schemas.microsoft.com/office/drawing/2014/main" id="{F97E2032-4C00-40B4-9336-5CF3FFD63602}"/>
+                    </a:ext>
+                  </a:extLst>
+                </p:cNvPr>
+                <p:cNvSpPr/>
+                <p:nvPr/>
+              </p:nvSpPr>
+              <p:spPr>
+                <a:xfrm>
+                  <a:off x="5791028" y="2358782"/>
+                  <a:ext cx="479765" cy="146353"/>
+                </a:xfrm>
+                <a:prstGeom prst="rect">
+                  <a:avLst/>
+                </a:prstGeom>
+                <a:noFill/>
+                <a:ln w="19050">
+                  <a:solidFill>
+                    <a:schemeClr val="tx1"/>
+                  </a:solidFill>
+                </a:ln>
+              </p:spPr>
+              <p:style>
+                <a:lnRef idx="2">
+                  <a:schemeClr val="accent1">
+                    <a:shade val="50000"/>
+                  </a:schemeClr>
+                </a:lnRef>
+                <a:fillRef idx="1">
+                  <a:schemeClr val="accent1"/>
+                </a:fillRef>
+                <a:effectRef idx="0">
+                  <a:schemeClr val="accent1"/>
+                </a:effectRef>
+                <a:fontRef idx="minor">
+                  <a:schemeClr val="lt1"/>
+                </a:fontRef>
+              </p:style>
+              <p:txBody>
+                <a:bodyPr rtlCol="0" anchor="ctr"/>
+                <a:lstStyle/>
+                <a:p>
+                  <a:pPr algn="ctr"/>
+                  <a:endParaRPr lang="en-US">
+                    <a:solidFill>
+                      <a:sysClr val="windowText" lastClr="000000"/>
+                    </a:solidFill>
+                  </a:endParaRPr>
+                </a:p>
+              </p:txBody>
+            </p:sp>
+            <p:sp>
+              <p:nvSpPr>
+                <p:cNvPr id="24" name="กล่องข้อความ 23">
+                  <a:extLst>
+                    <a:ext uri="{FF2B5EF4-FFF2-40B4-BE49-F238E27FC236}">
+                      <a16:creationId xmlns:a16="http://schemas.microsoft.com/office/drawing/2014/main" id="{4544B5B9-028B-4348-9811-B01E352FA17B}"/>
+                    </a:ext>
+                  </a:extLst>
+                </p:cNvPr>
+                <p:cNvSpPr txBox="1"/>
+                <p:nvPr/>
+              </p:nvSpPr>
+              <p:spPr>
+                <a:xfrm>
+                  <a:off x="4513027" y="3193365"/>
+                  <a:ext cx="800284" cy="369332"/>
+                </a:xfrm>
+                <a:prstGeom prst="rect">
+                  <a:avLst/>
+                </a:prstGeom>
+                <a:noFill/>
+              </p:spPr>
+              <p:txBody>
+                <a:bodyPr wrap="none" rtlCol="0">
+                  <a:spAutoFit/>
+                </a:bodyPr>
+                <a:lstStyle/>
+                <a:p>
+                  <a:r>
+                    <a:rPr lang="en-US" dirty="0"/>
+                    <a:t>Switch</a:t>
+                  </a:r>
+                </a:p>
+              </p:txBody>
+            </p:sp>
+            <p:sp>
+              <p:nvSpPr>
+                <p:cNvPr id="25" name="กล่องข้อความ 24">
+                  <a:extLst>
+                    <a:ext uri="{FF2B5EF4-FFF2-40B4-BE49-F238E27FC236}">
+                      <a16:creationId xmlns:a16="http://schemas.microsoft.com/office/drawing/2014/main" id="{1B99B342-7C6B-4615-89ED-65EC90535663}"/>
+                    </a:ext>
+                  </a:extLst>
+                </p:cNvPr>
+                <p:cNvSpPr txBox="1"/>
+                <p:nvPr/>
+              </p:nvSpPr>
+              <p:spPr>
+                <a:xfrm>
+                  <a:off x="6827940" y="3136215"/>
+                  <a:ext cx="800284" cy="369332"/>
+                </a:xfrm>
+                <a:prstGeom prst="rect">
+                  <a:avLst/>
+                </a:prstGeom>
+                <a:noFill/>
+              </p:spPr>
+              <p:txBody>
+                <a:bodyPr wrap="none" rtlCol="0">
+                  <a:spAutoFit/>
+                </a:bodyPr>
+                <a:lstStyle/>
+                <a:p>
+                  <a:r>
+                    <a:rPr lang="en-US" dirty="0"/>
+                    <a:t>Switch</a:t>
+                  </a:r>
+                </a:p>
+              </p:txBody>
+            </p:sp>
+            <p:sp>
+              <p:nvSpPr>
+                <p:cNvPr id="27" name="กล่องข้อความ 26">
+                  <a:extLst>
+                    <a:ext uri="{FF2B5EF4-FFF2-40B4-BE49-F238E27FC236}">
+                      <a16:creationId xmlns:a16="http://schemas.microsoft.com/office/drawing/2014/main" id="{0FB257B7-EA35-4108-82AA-53731650F3D0}"/>
+                    </a:ext>
+                  </a:extLst>
+                </p:cNvPr>
+                <p:cNvSpPr txBox="1"/>
+                <p:nvPr/>
+              </p:nvSpPr>
+              <p:spPr>
+                <a:xfrm>
+                  <a:off x="5509570" y="4333454"/>
+                  <a:ext cx="1042680" cy="923330"/>
+                </a:xfrm>
+                <a:prstGeom prst="rect">
+                  <a:avLst/>
+                </a:prstGeom>
+                <a:noFill/>
+              </p:spPr>
+              <p:txBody>
+                <a:bodyPr wrap="square" rtlCol="0">
+                  <a:spAutoFit/>
+                </a:bodyPr>
+                <a:lstStyle/>
+                <a:p>
+                  <a:pPr algn="ctr"/>
+                  <a:r>
+                    <a:rPr lang="en-US" dirty="0"/>
+                    <a:t>Arduino Pro Micro</a:t>
+                  </a:r>
+                </a:p>
+              </p:txBody>
+            </p:sp>
+            <p:sp>
+              <p:nvSpPr>
+                <p:cNvPr id="28" name="กล่องข้อความ 27">
+                  <a:extLst>
+                    <a:ext uri="{FF2B5EF4-FFF2-40B4-BE49-F238E27FC236}">
+                      <a16:creationId xmlns:a16="http://schemas.microsoft.com/office/drawing/2014/main" id="{E9910CA7-B4DB-477A-B562-2B965959D6EB}"/>
+                    </a:ext>
+                  </a:extLst>
+                </p:cNvPr>
+                <p:cNvSpPr txBox="1"/>
+                <p:nvPr/>
+              </p:nvSpPr>
+              <p:spPr>
+                <a:xfrm>
+                  <a:off x="4547555" y="886035"/>
+                  <a:ext cx="2966710" cy="523220"/>
+                </a:xfrm>
+                <a:prstGeom prst="rect">
+                  <a:avLst/>
+                </a:prstGeom>
+                <a:noFill/>
+              </p:spPr>
+              <p:txBody>
+                <a:bodyPr wrap="none" rtlCol="0">
+                  <a:spAutoFit/>
+                </a:bodyPr>
+                <a:lstStyle/>
+                <a:p>
+                  <a:r>
+                    <a:rPr lang="en-US" sz="2800" dirty="0"/>
+                    <a:t>Assembly Positions</a:t>
+                  </a:r>
+                </a:p>
+              </p:txBody>
+            </p:sp>
+          </p:grpSp>
+          <p:grpSp>
+            <p:nvGrpSpPr>
+              <p:cNvPr id="5" name="กลุ่ม 4">
                 <a:extLst>
                   <a:ext uri="{FF2B5EF4-FFF2-40B4-BE49-F238E27FC236}">
-                    <a16:creationId xmlns:a16="http://schemas.microsoft.com/office/drawing/2014/main" id="{D49731BF-F176-4D63-80CD-E01E1AA3E1B9}"/>
+                    <a16:creationId xmlns:a16="http://schemas.microsoft.com/office/drawing/2014/main" id="{73617DBD-42D8-4C9D-A11E-1A3C3B9BC7CA}"/>
                   </a:ext>
                 </a:extLst>
               </p:cNvPr>
-              <p:cNvSpPr/>
+              <p:cNvGrpSpPr/>
               <p:nvPr/>
-            </p:nvSpPr>
-            <p:spPr>
+            </p:nvGrpSpPr>
+            <p:grpSpPr>
               <a:xfrm>
-                <a:off x="3735613" y="2288195"/>
-                <a:ext cx="4590597" cy="3519376"/>
+                <a:off x="3742069" y="5190160"/>
+                <a:ext cx="537327" cy="439166"/>
+                <a:chOff x="3742069" y="5190160"/>
+                <a:chExt cx="537327" cy="439166"/>
               </a:xfrm>
-              <a:prstGeom prst="rect">
-                <a:avLst/>
-              </a:prstGeom>
-              <a:noFill/>
-              <a:ln w="38100">
-                <a:solidFill>
-                  <a:schemeClr val="tx1"/>
-                </a:solidFill>
-              </a:ln>
-            </p:spPr>
-            <p:style>
-              <a:lnRef idx="2">
-                <a:schemeClr val="accent1">
-                  <a:shade val="50000"/>
-                </a:schemeClr>
-              </a:lnRef>
-              <a:fillRef idx="1">
-                <a:schemeClr val="accent1"/>
-              </a:fillRef>
-              <a:effectRef idx="0">
-                <a:schemeClr val="accent1"/>
-              </a:effectRef>
-              <a:fontRef idx="minor">
-                <a:schemeClr val="lt1"/>
-              </a:fontRef>
-            </p:style>
-            <p:txBody>
-              <a:bodyPr rtlCol="0" anchor="ctr"/>
-              <a:lstStyle/>
-              <a:p>
-                <a:pPr algn="ctr"/>
-                <a:endParaRPr lang="en-US"/>
-              </a:p>
-            </p:txBody>
-          </p:sp>
-          <p:cxnSp>
-            <p:nvCxnSpPr>
-              <p:cNvPr id="8" name="ลูกศรเชื่อมต่อแบบตรง 7">
+            </p:grpSpPr>
+            <p:sp>
+              <p:nvSpPr>
+                <p:cNvPr id="2" name="วงรี 1">
+                  <a:extLst>
+                    <a:ext uri="{FF2B5EF4-FFF2-40B4-BE49-F238E27FC236}">
+                      <a16:creationId xmlns:a16="http://schemas.microsoft.com/office/drawing/2014/main" id="{B5ACC5BC-990F-474B-8690-3703FFD56502}"/>
+                    </a:ext>
+                  </a:extLst>
+                </p:cNvPr>
+                <p:cNvSpPr/>
+                <p:nvPr/>
+              </p:nvSpPr>
+              <p:spPr>
+                <a:xfrm>
+                  <a:off x="3788601" y="5190160"/>
+                  <a:ext cx="439166" cy="439166"/>
+                </a:xfrm>
+                <a:prstGeom prst="ellipse">
+                  <a:avLst/>
+                </a:prstGeom>
+                <a:noFill/>
+                <a:ln w="38100">
+                  <a:solidFill>
+                    <a:schemeClr val="tx1"/>
+                  </a:solidFill>
+                </a:ln>
+              </p:spPr>
+              <p:style>
+                <a:lnRef idx="2">
+                  <a:schemeClr val="accent1">
+                    <a:shade val="50000"/>
+                  </a:schemeClr>
+                </a:lnRef>
+                <a:fillRef idx="1">
+                  <a:schemeClr val="accent1"/>
+                </a:fillRef>
+                <a:effectRef idx="0">
+                  <a:schemeClr val="accent1"/>
+                </a:effectRef>
+                <a:fontRef idx="minor">
+                  <a:schemeClr val="lt1"/>
+                </a:fontRef>
+              </p:style>
+              <p:txBody>
+                <a:bodyPr rtlCol="0" anchor="ctr"/>
+                <a:lstStyle/>
+                <a:p>
+                  <a:pPr algn="ctr"/>
+                  <a:endParaRPr lang="en-US"/>
+                </a:p>
+              </p:txBody>
+            </p:sp>
+            <p:sp>
+              <p:nvSpPr>
+                <p:cNvPr id="3" name="กล่องข้อความ 2">
+                  <a:extLst>
+                    <a:ext uri="{FF2B5EF4-FFF2-40B4-BE49-F238E27FC236}">
+                      <a16:creationId xmlns:a16="http://schemas.microsoft.com/office/drawing/2014/main" id="{1CF050DA-F70D-4466-AB01-8F32D1659BF4}"/>
+                    </a:ext>
+                  </a:extLst>
+                </p:cNvPr>
+                <p:cNvSpPr txBox="1"/>
+                <p:nvPr/>
+              </p:nvSpPr>
+              <p:spPr>
+                <a:xfrm>
+                  <a:off x="3742069" y="5225077"/>
+                  <a:ext cx="537327" cy="369332"/>
+                </a:xfrm>
+                <a:prstGeom prst="rect">
+                  <a:avLst/>
+                </a:prstGeom>
+                <a:noFill/>
+              </p:spPr>
+              <p:txBody>
+                <a:bodyPr wrap="none" rtlCol="0">
+                  <a:spAutoFit/>
+                </a:bodyPr>
+                <a:lstStyle/>
+                <a:p>
+                  <a:r>
+                    <a:rPr lang="en-US" dirty="0"/>
+                    <a:t>LED</a:t>
+                  </a:r>
+                </a:p>
+              </p:txBody>
+            </p:sp>
+          </p:grpSp>
+          <p:grpSp>
+            <p:nvGrpSpPr>
+              <p:cNvPr id="20" name="กลุ่ม 19">
                 <a:extLst>
                   <a:ext uri="{FF2B5EF4-FFF2-40B4-BE49-F238E27FC236}">
-                    <a16:creationId xmlns:a16="http://schemas.microsoft.com/office/drawing/2014/main" id="{DC61EE91-CB26-484C-BF5A-7E113821A4F8}"/>
+                    <a16:creationId xmlns:a16="http://schemas.microsoft.com/office/drawing/2014/main" id="{384DB700-0BCF-42B6-8B43-5CAE993E0EEB}"/>
                   </a:ext>
                 </a:extLst>
               </p:cNvPr>
-              <p:cNvCxnSpPr>
-                <a:cxnSpLocks/>
-              </p:cNvCxnSpPr>
+              <p:cNvGrpSpPr/>
               <p:nvPr/>
-            </p:nvCxnSpPr>
-            <p:spPr>
+            </p:nvGrpSpPr>
+            <p:grpSpPr>
               <a:xfrm>
-                <a:off x="3735613" y="2043646"/>
-                <a:ext cx="4590597" cy="0"/>
+                <a:off x="7695571" y="5190160"/>
+                <a:ext cx="537327" cy="439166"/>
+                <a:chOff x="3742069" y="5190160"/>
+                <a:chExt cx="537327" cy="439166"/>
               </a:xfrm>
-              <a:prstGeom prst="straightConnector1">
-                <a:avLst/>
-              </a:prstGeom>
-              <a:ln w="38100">
-                <a:solidFill>
-                  <a:schemeClr val="tx1"/>
-                </a:solidFill>
-                <a:headEnd type="triangle"/>
-                <a:tailEnd type="triangle"/>
-              </a:ln>
-            </p:spPr>
-            <p:style>
-              <a:lnRef idx="1">
-                <a:schemeClr val="accent1"/>
-              </a:lnRef>
-              <a:fillRef idx="0">
-                <a:schemeClr val="accent1"/>
-              </a:fillRef>
-              <a:effectRef idx="0">
-                <a:schemeClr val="accent1"/>
-              </a:effectRef>
-              <a:fontRef idx="minor">
-                <a:schemeClr val="tx1"/>
-              </a:fontRef>
-            </p:style>
-          </p:cxnSp>
-          <p:cxnSp>
-            <p:nvCxnSpPr>
-              <p:cNvPr id="9" name="ลูกศรเชื่อมต่อแบบตรง 8">
-                <a:extLst>
-                  <a:ext uri="{FF2B5EF4-FFF2-40B4-BE49-F238E27FC236}">
-                    <a16:creationId xmlns:a16="http://schemas.microsoft.com/office/drawing/2014/main" id="{1C21033C-BE05-4E0F-A172-5DC762C68179}"/>
-                  </a:ext>
-                </a:extLst>
-              </p:cNvPr>
-              <p:cNvCxnSpPr>
-                <a:cxnSpLocks/>
-              </p:cNvCxnSpPr>
-              <p:nvPr/>
-            </p:nvCxnSpPr>
-            <p:spPr>
-              <a:xfrm>
-                <a:off x="3526507" y="2288195"/>
-                <a:ext cx="0" cy="3519376"/>
-              </a:xfrm>
-              <a:prstGeom prst="straightConnector1">
-                <a:avLst/>
-              </a:prstGeom>
-              <a:ln w="38100">
-                <a:solidFill>
-                  <a:schemeClr val="tx1"/>
-                </a:solidFill>
-                <a:headEnd type="triangle"/>
-                <a:tailEnd type="triangle"/>
-              </a:ln>
-            </p:spPr>
-            <p:style>
-              <a:lnRef idx="1">
-                <a:schemeClr val="accent1"/>
-              </a:lnRef>
-              <a:fillRef idx="0">
-                <a:schemeClr val="accent1"/>
-              </a:fillRef>
-              <a:effectRef idx="0">
-                <a:schemeClr val="accent1"/>
-              </a:effectRef>
-              <a:fontRef idx="minor">
-                <a:schemeClr val="tx1"/>
-              </a:fontRef>
-            </p:style>
-          </p:cxnSp>
-          <p:sp>
-            <p:nvSpPr>
-              <p:cNvPr id="12" name="กล่องข้อความ 11">
-                <a:extLst>
-                  <a:ext uri="{FF2B5EF4-FFF2-40B4-BE49-F238E27FC236}">
-                    <a16:creationId xmlns:a16="http://schemas.microsoft.com/office/drawing/2014/main" id="{09EA24E5-0281-4646-9758-771DEF338D8F}"/>
-                  </a:ext>
-                </a:extLst>
-              </p:cNvPr>
-              <p:cNvSpPr txBox="1"/>
-              <p:nvPr/>
-            </p:nvSpPr>
-            <p:spPr>
-              <a:xfrm>
-                <a:off x="5831733" y="1552040"/>
-                <a:ext cx="636713" cy="369332"/>
-              </a:xfrm>
-              <a:prstGeom prst="rect">
-                <a:avLst/>
-              </a:prstGeom>
-              <a:noFill/>
-            </p:spPr>
-            <p:txBody>
-              <a:bodyPr wrap="none" rtlCol="0">
-                <a:spAutoFit/>
-              </a:bodyPr>
-              <a:lstStyle/>
-              <a:p>
-                <a:r>
-                  <a:rPr lang="en-US" dirty="0"/>
-                  <a:t>5 cm</a:t>
-                </a:r>
-              </a:p>
-            </p:txBody>
-          </p:sp>
-          <p:sp>
-            <p:nvSpPr>
-              <p:cNvPr id="13" name="กล่องข้อความ 12">
-                <a:extLst>
-                  <a:ext uri="{FF2B5EF4-FFF2-40B4-BE49-F238E27FC236}">
-                    <a16:creationId xmlns:a16="http://schemas.microsoft.com/office/drawing/2014/main" id="{286CD45A-6D2B-45A2-9038-2B0733334B16}"/>
-                  </a:ext>
-                </a:extLst>
-              </p:cNvPr>
-              <p:cNvSpPr txBox="1"/>
-              <p:nvPr/>
-            </p:nvSpPr>
-            <p:spPr>
-              <a:xfrm>
-                <a:off x="2889794" y="3863217"/>
-                <a:ext cx="636713" cy="369332"/>
-              </a:xfrm>
-              <a:prstGeom prst="rect">
-                <a:avLst/>
-              </a:prstGeom>
-              <a:noFill/>
-            </p:spPr>
-            <p:txBody>
-              <a:bodyPr wrap="none" rtlCol="0">
-                <a:spAutoFit/>
-              </a:bodyPr>
-              <a:lstStyle/>
-              <a:p>
-                <a:r>
-                  <a:rPr lang="en-US" dirty="0"/>
-                  <a:t>4 cm</a:t>
-                </a:r>
-              </a:p>
-            </p:txBody>
-          </p:sp>
-          <p:sp>
-            <p:nvSpPr>
-              <p:cNvPr id="14" name="สี่เหลี่ยมผืนผ้า 13">
-                <a:extLst>
-                  <a:ext uri="{FF2B5EF4-FFF2-40B4-BE49-F238E27FC236}">
-                    <a16:creationId xmlns:a16="http://schemas.microsoft.com/office/drawing/2014/main" id="{BDA8B72E-D3EC-4536-8D49-C914A13E283A}"/>
-                  </a:ext>
-                </a:extLst>
-              </p:cNvPr>
-              <p:cNvSpPr/>
-              <p:nvPr/>
-            </p:nvSpPr>
-            <p:spPr>
-              <a:xfrm>
-                <a:off x="4243318" y="2708180"/>
-                <a:ext cx="1339703" cy="1339703"/>
-              </a:xfrm>
-              <a:prstGeom prst="rect">
-                <a:avLst/>
-              </a:prstGeom>
-              <a:noFill/>
-              <a:ln w="38100">
-                <a:solidFill>
-                  <a:schemeClr val="tx1"/>
-                </a:solidFill>
-              </a:ln>
-            </p:spPr>
-            <p:style>
-              <a:lnRef idx="2">
-                <a:schemeClr val="accent1">
-                  <a:shade val="50000"/>
-                </a:schemeClr>
-              </a:lnRef>
-              <a:fillRef idx="1">
-                <a:schemeClr val="accent1"/>
-              </a:fillRef>
-              <a:effectRef idx="0">
-                <a:schemeClr val="accent1"/>
-              </a:effectRef>
-              <a:fontRef idx="minor">
-                <a:schemeClr val="lt1"/>
-              </a:fontRef>
-            </p:style>
-            <p:txBody>
-              <a:bodyPr rtlCol="0" anchor="ctr"/>
-              <a:lstStyle/>
-              <a:p>
-                <a:pPr algn="ctr"/>
-                <a:endParaRPr lang="en-US"/>
-              </a:p>
-            </p:txBody>
-          </p:sp>
-          <p:sp>
-            <p:nvSpPr>
-              <p:cNvPr id="17" name="สี่เหลี่ยมผืนผ้า 16">
-                <a:extLst>
-                  <a:ext uri="{FF2B5EF4-FFF2-40B4-BE49-F238E27FC236}">
-                    <a16:creationId xmlns:a16="http://schemas.microsoft.com/office/drawing/2014/main" id="{4AA5E00A-2065-40C3-A946-B7C411A0699B}"/>
-                  </a:ext>
-                </a:extLst>
-              </p:cNvPr>
-              <p:cNvSpPr/>
-              <p:nvPr/>
-            </p:nvSpPr>
-            <p:spPr>
-              <a:xfrm>
-                <a:off x="6457814" y="2708180"/>
-                <a:ext cx="1339703" cy="1339703"/>
-              </a:xfrm>
-              <a:prstGeom prst="rect">
-                <a:avLst/>
-              </a:prstGeom>
-              <a:noFill/>
-              <a:ln w="38100">
-                <a:solidFill>
-                  <a:schemeClr val="tx1"/>
-                </a:solidFill>
-              </a:ln>
-            </p:spPr>
-            <p:style>
-              <a:lnRef idx="2">
-                <a:schemeClr val="accent1">
-                  <a:shade val="50000"/>
-                </a:schemeClr>
-              </a:lnRef>
-              <a:fillRef idx="1">
-                <a:schemeClr val="accent1"/>
-              </a:fillRef>
-              <a:effectRef idx="0">
-                <a:schemeClr val="accent1"/>
-              </a:effectRef>
-              <a:fontRef idx="minor">
-                <a:schemeClr val="lt1"/>
-              </a:fontRef>
-            </p:style>
-            <p:txBody>
-              <a:bodyPr rtlCol="0" anchor="ctr"/>
-              <a:lstStyle/>
-              <a:p>
-                <a:pPr algn="ctr"/>
-                <a:endParaRPr lang="en-US"/>
-              </a:p>
-            </p:txBody>
-          </p:sp>
-          <p:sp>
-            <p:nvSpPr>
-              <p:cNvPr id="18" name="สี่เหลี่ยมผืนผ้า 17">
-                <a:extLst>
-                  <a:ext uri="{FF2B5EF4-FFF2-40B4-BE49-F238E27FC236}">
-                    <a16:creationId xmlns:a16="http://schemas.microsoft.com/office/drawing/2014/main" id="{FC5A3B32-EB45-424E-B37A-00A9E1F41ACD}"/>
-                  </a:ext>
-                </a:extLst>
-              </p:cNvPr>
-              <p:cNvSpPr/>
-              <p:nvPr/>
-            </p:nvSpPr>
-            <p:spPr>
-              <a:xfrm>
-                <a:off x="5257829" y="2505136"/>
-                <a:ext cx="1523997" cy="3124190"/>
-              </a:xfrm>
-              <a:prstGeom prst="rect">
-                <a:avLst/>
-              </a:prstGeom>
-              <a:noFill/>
-              <a:ln w="38100">
-                <a:solidFill>
-                  <a:schemeClr val="tx1"/>
-                </a:solidFill>
-              </a:ln>
-            </p:spPr>
-            <p:style>
-              <a:lnRef idx="2">
-                <a:schemeClr val="accent1">
-                  <a:shade val="50000"/>
-                </a:schemeClr>
-              </a:lnRef>
-              <a:fillRef idx="1">
-                <a:schemeClr val="accent1"/>
-              </a:fillRef>
-              <a:effectRef idx="0">
-                <a:schemeClr val="accent1"/>
-              </a:effectRef>
-              <a:fontRef idx="minor">
-                <a:schemeClr val="lt1"/>
-              </a:fontRef>
-            </p:style>
-            <p:txBody>
-              <a:bodyPr rtlCol="0" anchor="ctr"/>
-              <a:lstStyle/>
-              <a:p>
-                <a:pPr algn="ctr"/>
-                <a:endParaRPr lang="en-US"/>
-              </a:p>
-            </p:txBody>
-          </p:sp>
-          <p:sp>
-            <p:nvSpPr>
-              <p:cNvPr id="19" name="สี่เหลี่ยมผืนผ้า 18">
-                <a:extLst>
-                  <a:ext uri="{FF2B5EF4-FFF2-40B4-BE49-F238E27FC236}">
-                    <a16:creationId xmlns:a16="http://schemas.microsoft.com/office/drawing/2014/main" id="{F97E2032-4C00-40B4-9336-5CF3FFD63602}"/>
-                  </a:ext>
-                </a:extLst>
-              </p:cNvPr>
-              <p:cNvSpPr/>
-              <p:nvPr/>
-            </p:nvSpPr>
-            <p:spPr>
-              <a:xfrm>
-                <a:off x="5791028" y="2358782"/>
-                <a:ext cx="479765" cy="146353"/>
-              </a:xfrm>
-              <a:prstGeom prst="rect">
-                <a:avLst/>
-              </a:prstGeom>
-              <a:noFill/>
-              <a:ln w="19050">
-                <a:solidFill>
-                  <a:schemeClr val="tx1"/>
-                </a:solidFill>
-              </a:ln>
-            </p:spPr>
-            <p:style>
-              <a:lnRef idx="2">
-                <a:schemeClr val="accent1">
-                  <a:shade val="50000"/>
-                </a:schemeClr>
-              </a:lnRef>
-              <a:fillRef idx="1">
-                <a:schemeClr val="accent1"/>
-              </a:fillRef>
-              <a:effectRef idx="0">
-                <a:schemeClr val="accent1"/>
-              </a:effectRef>
-              <a:fontRef idx="minor">
-                <a:schemeClr val="lt1"/>
-              </a:fontRef>
-            </p:style>
-            <p:txBody>
-              <a:bodyPr rtlCol="0" anchor="ctr"/>
-              <a:lstStyle/>
-              <a:p>
-                <a:pPr algn="ctr"/>
-                <a:endParaRPr lang="en-US">
+            </p:grpSpPr>
+            <p:sp>
+              <p:nvSpPr>
+                <p:cNvPr id="21" name="วงรี 20">
+                  <a:extLst>
+                    <a:ext uri="{FF2B5EF4-FFF2-40B4-BE49-F238E27FC236}">
+                      <a16:creationId xmlns:a16="http://schemas.microsoft.com/office/drawing/2014/main" id="{39981966-6637-4AAE-A9AD-178D8EEF5EAC}"/>
+                    </a:ext>
+                  </a:extLst>
+                </p:cNvPr>
+                <p:cNvSpPr/>
+                <p:nvPr/>
+              </p:nvSpPr>
+              <p:spPr>
+                <a:xfrm>
+                  <a:off x="3788601" y="5190160"/>
+                  <a:ext cx="439166" cy="439166"/>
+                </a:xfrm>
+                <a:prstGeom prst="ellipse">
+                  <a:avLst/>
+                </a:prstGeom>
+                <a:noFill/>
+                <a:ln w="38100">
                   <a:solidFill>
-                    <a:sysClr val="windowText" lastClr="000000"/>
+                    <a:schemeClr val="tx1"/>
                   </a:solidFill>
-                </a:endParaRPr>
-              </a:p>
-            </p:txBody>
-          </p:sp>
-          <p:sp>
-            <p:nvSpPr>
-              <p:cNvPr id="24" name="กล่องข้อความ 23">
-                <a:extLst>
-                  <a:ext uri="{FF2B5EF4-FFF2-40B4-BE49-F238E27FC236}">
-                    <a16:creationId xmlns:a16="http://schemas.microsoft.com/office/drawing/2014/main" id="{4544B5B9-028B-4348-9811-B01E352FA17B}"/>
-                  </a:ext>
-                </a:extLst>
-              </p:cNvPr>
-              <p:cNvSpPr txBox="1"/>
-              <p:nvPr/>
-            </p:nvSpPr>
-            <p:spPr>
-              <a:xfrm>
-                <a:off x="4513027" y="3193365"/>
-                <a:ext cx="800284" cy="369332"/>
-              </a:xfrm>
-              <a:prstGeom prst="rect">
-                <a:avLst/>
-              </a:prstGeom>
-              <a:noFill/>
-            </p:spPr>
-            <p:txBody>
-              <a:bodyPr wrap="none" rtlCol="0">
-                <a:spAutoFit/>
-              </a:bodyPr>
-              <a:lstStyle/>
-              <a:p>
-                <a:r>
-                  <a:rPr lang="en-US" dirty="0"/>
-                  <a:t>Switch</a:t>
-                </a:r>
-              </a:p>
-            </p:txBody>
-          </p:sp>
-          <p:sp>
-            <p:nvSpPr>
-              <p:cNvPr id="25" name="กล่องข้อความ 24">
-                <a:extLst>
-                  <a:ext uri="{FF2B5EF4-FFF2-40B4-BE49-F238E27FC236}">
-                    <a16:creationId xmlns:a16="http://schemas.microsoft.com/office/drawing/2014/main" id="{1B99B342-7C6B-4615-89ED-65EC90535663}"/>
-                  </a:ext>
-                </a:extLst>
-              </p:cNvPr>
-              <p:cNvSpPr txBox="1"/>
-              <p:nvPr/>
-            </p:nvSpPr>
-            <p:spPr>
-              <a:xfrm>
-                <a:off x="6827940" y="3136215"/>
-                <a:ext cx="800284" cy="369332"/>
-              </a:xfrm>
-              <a:prstGeom prst="rect">
-                <a:avLst/>
-              </a:prstGeom>
-              <a:noFill/>
-            </p:spPr>
-            <p:txBody>
-              <a:bodyPr wrap="none" rtlCol="0">
-                <a:spAutoFit/>
-              </a:bodyPr>
-              <a:lstStyle/>
-              <a:p>
-                <a:r>
-                  <a:rPr lang="en-US" dirty="0"/>
-                  <a:t>Switch</a:t>
-                </a:r>
-              </a:p>
-            </p:txBody>
-          </p:sp>
-          <p:sp>
-            <p:nvSpPr>
-              <p:cNvPr id="27" name="กล่องข้อความ 26">
-                <a:extLst>
-                  <a:ext uri="{FF2B5EF4-FFF2-40B4-BE49-F238E27FC236}">
-                    <a16:creationId xmlns:a16="http://schemas.microsoft.com/office/drawing/2014/main" id="{0FB257B7-EA35-4108-82AA-53731650F3D0}"/>
-                  </a:ext>
-                </a:extLst>
-              </p:cNvPr>
-              <p:cNvSpPr txBox="1"/>
-              <p:nvPr/>
-            </p:nvSpPr>
-            <p:spPr>
-              <a:xfrm>
-                <a:off x="5509570" y="4333454"/>
-                <a:ext cx="1042680" cy="923330"/>
-              </a:xfrm>
-              <a:prstGeom prst="rect">
-                <a:avLst/>
-              </a:prstGeom>
-              <a:noFill/>
-            </p:spPr>
-            <p:txBody>
-              <a:bodyPr wrap="square" rtlCol="0">
-                <a:spAutoFit/>
-              </a:bodyPr>
-              <a:lstStyle/>
-              <a:p>
-                <a:pPr algn="ctr"/>
-                <a:r>
-                  <a:rPr lang="en-US" dirty="0"/>
-                  <a:t>Arduino Pro Micro</a:t>
-                </a:r>
-              </a:p>
-            </p:txBody>
-          </p:sp>
-          <p:sp>
-            <p:nvSpPr>
-              <p:cNvPr id="28" name="กล่องข้อความ 27">
-                <a:extLst>
-                  <a:ext uri="{FF2B5EF4-FFF2-40B4-BE49-F238E27FC236}">
-                    <a16:creationId xmlns:a16="http://schemas.microsoft.com/office/drawing/2014/main" id="{E9910CA7-B4DB-477A-B562-2B965959D6EB}"/>
-                  </a:ext>
-                </a:extLst>
-              </p:cNvPr>
-              <p:cNvSpPr txBox="1"/>
-              <p:nvPr/>
-            </p:nvSpPr>
-            <p:spPr>
-              <a:xfrm>
-                <a:off x="4547555" y="886035"/>
-                <a:ext cx="2966710" cy="523220"/>
-              </a:xfrm>
-              <a:prstGeom prst="rect">
-                <a:avLst/>
-              </a:prstGeom>
-              <a:noFill/>
-            </p:spPr>
-            <p:txBody>
-              <a:bodyPr wrap="none" rtlCol="0">
-                <a:spAutoFit/>
-              </a:bodyPr>
-              <a:lstStyle/>
-              <a:p>
-                <a:r>
-                  <a:rPr lang="en-US" sz="2800" dirty="0"/>
-                  <a:t>Assembly Positions</a:t>
-                </a:r>
-              </a:p>
-            </p:txBody>
-          </p:sp>
-        </p:grpSp>
-        <p:grpSp>
-          <p:nvGrpSpPr>
-            <p:cNvPr id="5" name="กลุ่ม 4">
-              <a:extLst>
-                <a:ext uri="{FF2B5EF4-FFF2-40B4-BE49-F238E27FC236}">
-                  <a16:creationId xmlns:a16="http://schemas.microsoft.com/office/drawing/2014/main" id="{73617DBD-42D8-4C9D-A11E-1A3C3B9BC7CA}"/>
-                </a:ext>
-              </a:extLst>
-            </p:cNvPr>
-            <p:cNvGrpSpPr/>
-            <p:nvPr/>
-          </p:nvGrpSpPr>
-          <p:grpSpPr>
-            <a:xfrm>
-              <a:off x="3742069" y="5190160"/>
-              <a:ext cx="537327" cy="439166"/>
-              <a:chOff x="3742069" y="5190160"/>
-              <a:chExt cx="537327" cy="439166"/>
-            </a:xfrm>
-          </p:grpSpPr>
-          <p:sp>
-            <p:nvSpPr>
-              <p:cNvPr id="2" name="วงรี 1">
-                <a:extLst>
-                  <a:ext uri="{FF2B5EF4-FFF2-40B4-BE49-F238E27FC236}">
-                    <a16:creationId xmlns:a16="http://schemas.microsoft.com/office/drawing/2014/main" id="{B5ACC5BC-990F-474B-8690-3703FFD56502}"/>
-                  </a:ext>
-                </a:extLst>
-              </p:cNvPr>
-              <p:cNvSpPr/>
-              <p:nvPr/>
-            </p:nvSpPr>
-            <p:spPr>
-              <a:xfrm>
-                <a:off x="3788601" y="5190160"/>
-                <a:ext cx="439166" cy="439166"/>
-              </a:xfrm>
-              <a:prstGeom prst="ellipse">
-                <a:avLst/>
-              </a:prstGeom>
-              <a:noFill/>
-              <a:ln w="38100">
-                <a:solidFill>
-                  <a:schemeClr val="tx1"/>
-                </a:solidFill>
-              </a:ln>
-            </p:spPr>
-            <p:style>
-              <a:lnRef idx="2">
-                <a:schemeClr val="accent1">
-                  <a:shade val="50000"/>
-                </a:schemeClr>
-              </a:lnRef>
-              <a:fillRef idx="1">
-                <a:schemeClr val="accent1"/>
-              </a:fillRef>
-              <a:effectRef idx="0">
-                <a:schemeClr val="accent1"/>
-              </a:effectRef>
-              <a:fontRef idx="minor">
-                <a:schemeClr val="lt1"/>
-              </a:fontRef>
-            </p:style>
-            <p:txBody>
-              <a:bodyPr rtlCol="0" anchor="ctr"/>
-              <a:lstStyle/>
-              <a:p>
-                <a:pPr algn="ctr"/>
-                <a:endParaRPr lang="en-US"/>
-              </a:p>
-            </p:txBody>
-          </p:sp>
-          <p:sp>
-            <p:nvSpPr>
-              <p:cNvPr id="3" name="กล่องข้อความ 2">
-                <a:extLst>
-                  <a:ext uri="{FF2B5EF4-FFF2-40B4-BE49-F238E27FC236}">
-                    <a16:creationId xmlns:a16="http://schemas.microsoft.com/office/drawing/2014/main" id="{1CF050DA-F70D-4466-AB01-8F32D1659BF4}"/>
-                  </a:ext>
-                </a:extLst>
-              </p:cNvPr>
-              <p:cNvSpPr txBox="1"/>
-              <p:nvPr/>
-            </p:nvSpPr>
-            <p:spPr>
-              <a:xfrm>
-                <a:off x="3742069" y="5225077"/>
-                <a:ext cx="537327" cy="369332"/>
-              </a:xfrm>
-              <a:prstGeom prst="rect">
-                <a:avLst/>
-              </a:prstGeom>
-              <a:noFill/>
-            </p:spPr>
-            <p:txBody>
-              <a:bodyPr wrap="none" rtlCol="0">
-                <a:spAutoFit/>
-              </a:bodyPr>
-              <a:lstStyle/>
-              <a:p>
-                <a:r>
-                  <a:rPr lang="en-US" dirty="0"/>
-                  <a:t>LED</a:t>
-                </a:r>
-              </a:p>
-            </p:txBody>
-          </p:sp>
-        </p:grpSp>
-        <p:grpSp>
-          <p:nvGrpSpPr>
-            <p:cNvPr id="20" name="กลุ่ม 19">
-              <a:extLst>
-                <a:ext uri="{FF2B5EF4-FFF2-40B4-BE49-F238E27FC236}">
-                  <a16:creationId xmlns:a16="http://schemas.microsoft.com/office/drawing/2014/main" id="{384DB700-0BCF-42B6-8B43-5CAE993E0EEB}"/>
-                </a:ext>
-              </a:extLst>
-            </p:cNvPr>
-            <p:cNvGrpSpPr/>
-            <p:nvPr/>
-          </p:nvGrpSpPr>
-          <p:grpSpPr>
-            <a:xfrm>
-              <a:off x="7695571" y="5190160"/>
-              <a:ext cx="537327" cy="439166"/>
-              <a:chOff x="3742069" y="5190160"/>
-              <a:chExt cx="537327" cy="439166"/>
-            </a:xfrm>
-          </p:grpSpPr>
-          <p:sp>
-            <p:nvSpPr>
-              <p:cNvPr id="21" name="วงรี 20">
-                <a:extLst>
-                  <a:ext uri="{FF2B5EF4-FFF2-40B4-BE49-F238E27FC236}">
-                    <a16:creationId xmlns:a16="http://schemas.microsoft.com/office/drawing/2014/main" id="{39981966-6637-4AAE-A9AD-178D8EEF5EAC}"/>
-                  </a:ext>
-                </a:extLst>
-              </p:cNvPr>
-              <p:cNvSpPr/>
-              <p:nvPr/>
-            </p:nvSpPr>
-            <p:spPr>
-              <a:xfrm>
-                <a:off x="3788601" y="5190160"/>
-                <a:ext cx="439166" cy="439166"/>
-              </a:xfrm>
-              <a:prstGeom prst="ellipse">
-                <a:avLst/>
-              </a:prstGeom>
-              <a:noFill/>
-              <a:ln w="38100">
-                <a:solidFill>
-                  <a:schemeClr val="tx1"/>
-                </a:solidFill>
-              </a:ln>
-            </p:spPr>
-            <p:style>
-              <a:lnRef idx="2">
-                <a:schemeClr val="accent1">
-                  <a:shade val="50000"/>
-                </a:schemeClr>
-              </a:lnRef>
-              <a:fillRef idx="1">
-                <a:schemeClr val="accent1"/>
-              </a:fillRef>
-              <a:effectRef idx="0">
-                <a:schemeClr val="accent1"/>
-              </a:effectRef>
-              <a:fontRef idx="minor">
-                <a:schemeClr val="lt1"/>
-              </a:fontRef>
-            </p:style>
-            <p:txBody>
-              <a:bodyPr rtlCol="0" anchor="ctr"/>
-              <a:lstStyle/>
-              <a:p>
-                <a:pPr algn="ctr"/>
-                <a:endParaRPr lang="en-US"/>
-              </a:p>
-            </p:txBody>
-          </p:sp>
-          <p:sp>
-            <p:nvSpPr>
-              <p:cNvPr id="23" name="กล่องข้อความ 22">
-                <a:extLst>
-                  <a:ext uri="{FF2B5EF4-FFF2-40B4-BE49-F238E27FC236}">
-                    <a16:creationId xmlns:a16="http://schemas.microsoft.com/office/drawing/2014/main" id="{1E2190EF-6705-40DE-8CBF-914A70ABADA4}"/>
-                  </a:ext>
-                </a:extLst>
-              </p:cNvPr>
-              <p:cNvSpPr txBox="1"/>
-              <p:nvPr/>
-            </p:nvSpPr>
-            <p:spPr>
-              <a:xfrm>
-                <a:off x="3742069" y="5225077"/>
-                <a:ext cx="537327" cy="369332"/>
-              </a:xfrm>
-              <a:prstGeom prst="rect">
-                <a:avLst/>
-              </a:prstGeom>
-              <a:noFill/>
-            </p:spPr>
-            <p:txBody>
-              <a:bodyPr wrap="none" rtlCol="0">
-                <a:spAutoFit/>
-              </a:bodyPr>
-              <a:lstStyle/>
-              <a:p>
-                <a:r>
-                  <a:rPr lang="en-US" dirty="0"/>
-                  <a:t>LED</a:t>
-                </a:r>
-              </a:p>
-            </p:txBody>
-          </p:sp>
+                </a:ln>
+              </p:spPr>
+              <p:style>
+                <a:lnRef idx="2">
+                  <a:schemeClr val="accent1">
+                    <a:shade val="50000"/>
+                  </a:schemeClr>
+                </a:lnRef>
+                <a:fillRef idx="1">
+                  <a:schemeClr val="accent1"/>
+                </a:fillRef>
+                <a:effectRef idx="0">
+                  <a:schemeClr val="accent1"/>
+                </a:effectRef>
+                <a:fontRef idx="minor">
+                  <a:schemeClr val="lt1"/>
+                </a:fontRef>
+              </p:style>
+              <p:txBody>
+                <a:bodyPr rtlCol="0" anchor="ctr"/>
+                <a:lstStyle/>
+                <a:p>
+                  <a:pPr algn="ctr"/>
+                  <a:endParaRPr lang="en-US"/>
+                </a:p>
+              </p:txBody>
+            </p:sp>
+            <p:sp>
+              <p:nvSpPr>
+                <p:cNvPr id="23" name="กล่องข้อความ 22">
+                  <a:extLst>
+                    <a:ext uri="{FF2B5EF4-FFF2-40B4-BE49-F238E27FC236}">
+                      <a16:creationId xmlns:a16="http://schemas.microsoft.com/office/drawing/2014/main" id="{1E2190EF-6705-40DE-8CBF-914A70ABADA4}"/>
+                    </a:ext>
+                  </a:extLst>
+                </p:cNvPr>
+                <p:cNvSpPr txBox="1"/>
+                <p:nvPr/>
+              </p:nvSpPr>
+              <p:spPr>
+                <a:xfrm>
+                  <a:off x="3742069" y="5225077"/>
+                  <a:ext cx="537327" cy="369332"/>
+                </a:xfrm>
+                <a:prstGeom prst="rect">
+                  <a:avLst/>
+                </a:prstGeom>
+                <a:noFill/>
+              </p:spPr>
+              <p:txBody>
+                <a:bodyPr wrap="none" rtlCol="0">
+                  <a:spAutoFit/>
+                </a:bodyPr>
+                <a:lstStyle/>
+                <a:p>
+                  <a:r>
+                    <a:rPr lang="en-US" dirty="0"/>
+                    <a:t>LED</a:t>
+                  </a:r>
+                </a:p>
+              </p:txBody>
+            </p:sp>
+          </p:grpSp>
         </p:grpSp>
       </p:grpSp>
     </p:spTree>

</xml_diff>